<commit_message>
Updated slides with Patrick's suggestions
</commit_message>
<xml_diff>
--- a/documentation/presentations/20091210_c3pr_city_of_hope_demo/caBIG_C3PR Demo_Slides_CityofHope_wsw.pptx
+++ b/documentation/presentations/20091210_c3pr_city_of_hope_demo/caBIG_C3PR Demo_Slides_CityofHope_wsw.pptx
@@ -5,7 +5,7 @@
     <p:sldMasterId id="2147483660" r:id="rId1"/>
   </p:sldMasterIdLst>
   <p:notesMasterIdLst>
-    <p:notesMasterId r:id="rId15"/>
+    <p:notesMasterId r:id="rId16"/>
   </p:notesMasterIdLst>
   <p:sldIdLst>
     <p:sldId id="256" r:id="rId2"/>
@@ -14,13 +14,14 @@
     <p:sldId id="260" r:id="rId5"/>
     <p:sldId id="261" r:id="rId6"/>
     <p:sldId id="262" r:id="rId7"/>
-    <p:sldId id="263" r:id="rId8"/>
-    <p:sldId id="264" r:id="rId9"/>
-    <p:sldId id="265" r:id="rId10"/>
-    <p:sldId id="266" r:id="rId11"/>
-    <p:sldId id="267" r:id="rId12"/>
-    <p:sldId id="268" r:id="rId13"/>
-    <p:sldId id="269" r:id="rId14"/>
+    <p:sldId id="270" r:id="rId8"/>
+    <p:sldId id="263" r:id="rId9"/>
+    <p:sldId id="264" r:id="rId10"/>
+    <p:sldId id="265" r:id="rId11"/>
+    <p:sldId id="266" r:id="rId12"/>
+    <p:sldId id="267" r:id="rId13"/>
+    <p:sldId id="268" r:id="rId14"/>
+    <p:sldId id="269" r:id="rId15"/>
   </p:sldIdLst>
   <p:sldSz cx="9144000" cy="6858000" type="screen4x3"/>
   <p:notesSz cx="6858000" cy="9144000"/>
@@ -205,7 +206,7 @@
             <a:fld id="{AC348871-CAE5-9F4B-9F28-BEC0F1CCBFAF}" type="datetimeFigureOut">
               <a:rPr lang="en-US" smtClean="0"/>
               <a:pPr/>
-              <a:t>12/7/09</a:t>
+              <a:t>12/9/09</a:t>
             </a:fld>
             <a:endParaRPr lang="en-US"/>
           </a:p>
@@ -574,7 +575,7 @@
             <a:fld id="{6CBFF814-232D-5743-A7BC-D1BA2B7D9B11}" type="datetime1">
               <a:rPr lang="en-US"/>
               <a:pPr/>
-              <a:t>12/7/09</a:t>
+              <a:t>12/9/09</a:t>
             </a:fld>
             <a:endParaRPr lang="en-US"/>
           </a:p>
@@ -625,7 +626,7 @@
             <a:fld id="{5B4B09F3-F7C9-5A47-B2C6-39366E36F341}" type="slidenum">
               <a:rPr lang="en-US"/>
               <a:pPr/>
-              <a:t>11</a:t>
+              <a:t>12</a:t>
             </a:fld>
             <a:endParaRPr lang="en-US"/>
           </a:p>
@@ -688,7 +689,7 @@
             <a:fld id="{1A643560-72DD-D849-9A1D-0C8061C0E04F}" type="datetime1">
               <a:rPr lang="en-US"/>
               <a:pPr/>
-              <a:t>12/7/09</a:t>
+              <a:t>12/9/09</a:t>
             </a:fld>
             <a:endParaRPr lang="en-US"/>
           </a:p>
@@ -739,7 +740,7 @@
             <a:fld id="{67910869-6C04-A043-815F-4C0FA00D0F71}" type="slidenum">
               <a:rPr lang="en-US"/>
               <a:pPr/>
-              <a:t>12</a:t>
+              <a:t>13</a:t>
             </a:fld>
             <a:endParaRPr lang="en-US"/>
           </a:p>
@@ -802,7 +803,7 @@
             <a:fld id="{56C756D2-3CFA-1249-94D4-D38619D8FB38}" type="datetime1">
               <a:rPr lang="en-US"/>
               <a:pPr/>
-              <a:t>12/7/09</a:t>
+              <a:t>12/9/09</a:t>
             </a:fld>
             <a:endParaRPr lang="en-US"/>
           </a:p>
@@ -853,7 +854,7 @@
             <a:fld id="{2F50256F-C9A0-5246-86B6-3088FC247607}" type="slidenum">
               <a:rPr lang="en-US"/>
               <a:pPr/>
-              <a:t>13</a:t>
+              <a:t>14</a:t>
             </a:fld>
             <a:endParaRPr lang="en-US"/>
           </a:p>
@@ -916,7 +917,7 @@
             <a:fld id="{EC43E60C-C4E1-B144-8212-21D1AA37ECBD}" type="datetime1">
               <a:rPr lang="en-US"/>
               <a:pPr/>
-              <a:t>12/7/09</a:t>
+              <a:t>12/9/09</a:t>
             </a:fld>
             <a:endParaRPr lang="en-US"/>
           </a:p>
@@ -1003,7 +1004,7 @@
             <a:fld id="{CCCD8EF0-6AAA-0041-9AFA-B80AD3DCDAEB}" type="datetime1">
               <a:rPr lang="en-US"/>
               <a:pPr/>
-              <a:t>12/7/09</a:t>
+              <a:t>12/9/09</a:t>
             </a:fld>
             <a:endParaRPr lang="en-US"/>
           </a:p>
@@ -1220,7 +1221,7 @@
             <a:fld id="{A6688B3C-61FA-AD41-AA48-BC1815AC277E}" type="datetime1">
               <a:rPr lang="en-US"/>
               <a:pPr/>
-              <a:t>12/7/09</a:t>
+              <a:t>12/9/09</a:t>
             </a:fld>
             <a:endParaRPr lang="en-US"/>
           </a:p>
@@ -1334,7 +1335,7 @@
             <a:fld id="{1B6C00B4-337F-3F45-A4F5-494A1E638367}" type="datetime1">
               <a:rPr lang="en-US"/>
               <a:pPr/>
-              <a:t>12/7/09</a:t>
+              <a:t>12/9/09</a:t>
             </a:fld>
             <a:endParaRPr lang="en-US"/>
           </a:p>
@@ -1421,7 +1422,7 @@
             <a:fld id="{79EF64FB-141C-5C41-87D0-6A90B0E65275}" type="slidenum">
               <a:rPr lang="en-US"/>
               <a:pPr/>
-              <a:t>7</a:t>
+              <a:t>8</a:t>
             </a:fld>
             <a:endParaRPr lang="en-US"/>
           </a:p>
@@ -1447,7 +1448,7 @@
             <a:fld id="{3231DCCC-5141-3843-BD1B-407CA37D550F}" type="datetime1">
               <a:rPr lang="en-US"/>
               <a:pPr/>
-              <a:t>12/7/09</a:t>
+              <a:t>12/9/09</a:t>
             </a:fld>
             <a:endParaRPr lang="en-US"/>
           </a:p>
@@ -1498,7 +1499,7 @@
             <a:fld id="{60617D47-2561-FB4B-958C-7BB43D2DADA2}" type="slidenum">
               <a:rPr lang="en-US"/>
               <a:pPr/>
-              <a:t>8</a:t>
+              <a:t>9</a:t>
             </a:fld>
             <a:endParaRPr lang="en-US"/>
           </a:p>
@@ -1561,7 +1562,7 @@
             <a:fld id="{D0D3D530-C1C6-F24B-BE26-5212D87CB89D}" type="datetime1">
               <a:rPr lang="en-US"/>
               <a:pPr/>
-              <a:t>12/7/09</a:t>
+              <a:t>12/9/09</a:t>
             </a:fld>
             <a:endParaRPr lang="en-US"/>
           </a:p>
@@ -1628,7 +1629,7 @@
             <a:fld id="{B7A38AF1-9229-6C4A-860A-DF4B647E8706}" type="slidenum">
               <a:rPr lang="en-US" sz="1200"/>
               <a:pPr algn="r"/>
-              <a:t>9</a:t>
+              <a:t>10</a:t>
             </a:fld>
             <a:endParaRPr lang="en-US" sz="1200"/>
           </a:p>
@@ -1702,7 +1703,7 @@
             <a:fld id="{3646BFD8-4CDE-5845-94E8-B05EEADE9A7B}" type="datetime1">
               <a:rPr lang="en-US"/>
               <a:pPr/>
-              <a:t>12/7/09</a:t>
+              <a:t>12/9/09</a:t>
             </a:fld>
             <a:endParaRPr lang="en-US"/>
           </a:p>
@@ -1753,7 +1754,7 @@
             <a:fld id="{09C2F443-5CA8-4449-87AB-F99CF7C9AD30}" type="slidenum">
               <a:rPr lang="en-US"/>
               <a:pPr/>
-              <a:t>10</a:t>
+              <a:t>11</a:t>
             </a:fld>
             <a:endParaRPr lang="en-US"/>
           </a:p>
@@ -1816,7 +1817,7 @@
             <a:fld id="{EB124E64-4CB0-1A43-A467-28EA636CA40B}" type="datetime1">
               <a:rPr lang="en-US"/>
               <a:pPr/>
-              <a:t>12/7/09</a:t>
+              <a:t>12/9/09</a:t>
             </a:fld>
             <a:endParaRPr lang="en-US"/>
           </a:p>
@@ -4315,88 +4316,227 @@
       </p:grpSpPr>
       <p:sp>
         <p:nvSpPr>
-          <p:cNvPr id="36866" name="Rectangle 2"/>
+          <p:cNvPr id="34818" name="Rectangle 2"/>
           <p:cNvSpPr>
             <a:spLocks noGrp="1" noChangeArrowheads="1"/>
           </p:cNvSpPr>
           <p:nvPr>
-            <p:ph type="title"/>
-          </p:nvPr>
-        </p:nvSpPr>
-        <p:spPr/>
+            <p:ph type="title" idx="4294967295"/>
+          </p:nvPr>
+        </p:nvSpPr>
+        <p:spPr>
+          <a:xfrm>
+            <a:off x="777540" y="-207328"/>
+            <a:ext cx="6858000" cy="1143000"/>
+          </a:xfrm>
+        </p:spPr>
         <p:txBody>
           <a:bodyPr/>
           <a:lstStyle/>
           <a:p>
             <a:pPr eaLnBrk="1" hangingPunct="1"/>
             <a:r>
-              <a:rPr lang="en-US" sz="2600" dirty="0"/>
-              <a:t>Getting Started: </a:t>
-            </a:r>
-            <a:br>
-              <a:rPr lang="en-US" sz="2600" dirty="0"/>
-            </a:br>
-            <a:r>
-              <a:rPr lang="en-US" sz="2600" dirty="0"/>
-              <a:t>A Glance at the Technology</a:t>
-            </a:r>
-          </a:p>
-        </p:txBody>
-      </p:sp>
-      <p:sp>
-        <p:nvSpPr>
-          <p:cNvPr id="36867" name="Rectangle 3"/>
+              <a:rPr lang="en-US" dirty="0"/>
+              <a:t>Key Functions for Demo</a:t>
+            </a:r>
+          </a:p>
+        </p:txBody>
+      </p:sp>
+      <p:sp>
+        <p:nvSpPr>
+          <p:cNvPr id="34819" name="Rectangle 3"/>
           <p:cNvSpPr>
             <a:spLocks noGrp="1" noChangeArrowheads="1"/>
           </p:cNvSpPr>
           <p:nvPr>
-            <p:ph idx="1"/>
-          </p:nvPr>
-        </p:nvSpPr>
-        <p:spPr/>
+            <p:ph type="body" sz="half" idx="4294967295"/>
+          </p:nvPr>
+        </p:nvSpPr>
+        <p:spPr>
+          <a:xfrm>
+            <a:off x="0" y="1371600"/>
+            <a:ext cx="4151313" cy="4953000"/>
+          </a:xfrm>
+        </p:spPr>
         <p:txBody>
           <a:bodyPr/>
           <a:lstStyle/>
           <a:p>
-            <a:pPr eaLnBrk="1" hangingPunct="1"/>
-            <a:r>
-              <a:rPr lang="en-US" sz="2000"/>
-              <a:t>Tool Platform: </a:t>
-            </a:r>
-            <a:r>
-              <a:rPr lang="en-US" sz="2000" b="0"/>
-              <a:t>Web application hosted by an institution – requires a web browser for end user access</a:t>
-            </a:r>
-            <a:br>
-              <a:rPr lang="en-US" sz="2000" b="0"/>
-            </a:br>
-            <a:endParaRPr lang="en-US" sz="2000" b="0"/>
-          </a:p>
-          <a:p>
-            <a:pPr eaLnBrk="1" hangingPunct="1"/>
-            <a:r>
-              <a:rPr lang="en-US" sz="2000"/>
-              <a:t>Key Prerequisites: </a:t>
-            </a:r>
-            <a:r>
-              <a:rPr lang="en-US" sz="2000" b="0"/>
-              <a:t>Database (Oracle or Postgres), Application container (Tomcat), Java  </a:t>
-            </a:r>
-            <a:br>
-              <a:rPr lang="en-US" sz="2000" b="0"/>
-            </a:br>
-            <a:endParaRPr lang="en-US" sz="2000" b="0"/>
-          </a:p>
-          <a:p>
-            <a:pPr eaLnBrk="1" hangingPunct="1"/>
-            <a:r>
-              <a:rPr lang="en-US" sz="2000"/>
-              <a:t>End User Readiness:  </a:t>
-            </a:r>
-            <a:r>
-              <a:rPr lang="en-US" sz="2000" b="0"/>
-              <a:t>Administrators installing C3PR will require familiarity with databases and web applications; users of C3PR will require basic clinical knowledge and some training/orientation</a:t>
-            </a:r>
+            <a:pPr marL="228600" indent="-228600" eaLnBrk="1" hangingPunct="1">
+              <a:buFontTx/>
+              <a:buNone/>
+            </a:pPr>
+            <a:endParaRPr lang="en-US" sz="1800" b="0"/>
+          </a:p>
+          <a:p>
+            <a:pPr marL="228600" indent="-228600" eaLnBrk="1" hangingPunct="1">
+              <a:buFontTx/>
+              <a:buNone/>
+            </a:pPr>
+            <a:endParaRPr lang="en-US" sz="1600"/>
+          </a:p>
+        </p:txBody>
+      </p:sp>
+      <p:sp>
+        <p:nvSpPr>
+          <p:cNvPr id="34821" name="Rectangle 5"/>
+          <p:cNvSpPr>
+            <a:spLocks noChangeArrowheads="1"/>
+          </p:cNvSpPr>
+          <p:nvPr/>
+        </p:nvSpPr>
+        <p:spPr bwMode="auto">
+          <a:xfrm>
+            <a:off x="304800" y="1295400"/>
+            <a:ext cx="4648200" cy="5334000"/>
+          </a:xfrm>
+          <a:prstGeom prst="rect">
+            <a:avLst/>
+          </a:prstGeom>
+          <a:noFill/>
+          <a:ln w="9525">
+            <a:noFill/>
+            <a:miter lim="800000"/>
+            <a:headEnd/>
+            <a:tailEnd/>
+          </a:ln>
+        </p:spPr>
+        <p:txBody>
+          <a:bodyPr>
+            <a:prstTxWarp prst="textNoShape">
+              <a:avLst/>
+            </a:prstTxWarp>
+          </a:bodyPr>
+          <a:lstStyle/>
+          <a:p>
+            <a:pPr marL="336550" indent="-336550">
+              <a:spcBef>
+                <a:spcPct val="20000"/>
+              </a:spcBef>
+              <a:buClr>
+                <a:srgbClr val="00AAF6"/>
+              </a:buClr>
+              <a:buFontTx/>
+              <a:buChar char="•"/>
+            </a:pPr>
+            <a:endParaRPr lang="en-US" sz="1800" b="1" dirty="0"/>
+          </a:p>
+          <a:p>
+            <a:pPr marL="336550" indent="-336550">
+              <a:spcBef>
+                <a:spcPct val="20000"/>
+              </a:spcBef>
+              <a:buClr>
+                <a:srgbClr val="00AAF6"/>
+              </a:buClr>
+            </a:pPr>
+            <a:endParaRPr lang="en-US" b="1" dirty="0"/>
+          </a:p>
+          <a:p>
+            <a:pPr marL="336550" indent="-336550">
+              <a:spcBef>
+                <a:spcPct val="20000"/>
+              </a:spcBef>
+              <a:buClr>
+                <a:srgbClr val="00AAF6"/>
+              </a:buClr>
+              <a:buFontTx/>
+              <a:buChar char="•"/>
+            </a:pPr>
+            <a:r>
+              <a:rPr lang="en-US" sz="2600" b="1" dirty="0"/>
+              <a:t>Create a Study</a:t>
+            </a:r>
+          </a:p>
+          <a:p>
+            <a:pPr marL="336550" indent="-336550">
+              <a:spcBef>
+                <a:spcPct val="20000"/>
+              </a:spcBef>
+              <a:buClr>
+                <a:srgbClr val="00AAF6"/>
+              </a:buClr>
+              <a:buFontTx/>
+              <a:buChar char="•"/>
+            </a:pPr>
+            <a:r>
+              <a:rPr lang="en-US" sz="2600" b="1" dirty="0"/>
+              <a:t>Create a Subject</a:t>
+            </a:r>
+          </a:p>
+          <a:p>
+            <a:pPr marL="336550" indent="-336550">
+              <a:spcBef>
+                <a:spcPct val="20000"/>
+              </a:spcBef>
+              <a:buClr>
+                <a:srgbClr val="00AAF6"/>
+              </a:buClr>
+              <a:buFontTx/>
+              <a:buChar char="•"/>
+            </a:pPr>
+            <a:r>
+              <a:rPr lang="en-US" sz="2600" b="1" dirty="0"/>
+              <a:t>Register the Subject</a:t>
+            </a:r>
+          </a:p>
+          <a:p>
+            <a:pPr marL="336550" indent="-336550">
+              <a:spcBef>
+                <a:spcPct val="20000"/>
+              </a:spcBef>
+              <a:buClr>
+                <a:srgbClr val="00AAF6"/>
+              </a:buClr>
+              <a:buFontTx/>
+              <a:buChar char="•"/>
+            </a:pPr>
+            <a:r>
+              <a:rPr lang="en-US" sz="2600" b="1" dirty="0"/>
+              <a:t>Manage the Registration</a:t>
+            </a:r>
+          </a:p>
+          <a:p>
+            <a:pPr marL="336550" indent="-336550">
+              <a:spcBef>
+                <a:spcPct val="20000"/>
+              </a:spcBef>
+              <a:buClr>
+                <a:srgbClr val="00AAF6"/>
+              </a:buClr>
+              <a:buFontTx/>
+              <a:buChar char="•"/>
+            </a:pPr>
+            <a:r>
+              <a:rPr lang="en-US" sz="2600" b="1" dirty="0"/>
+              <a:t>Review other functions</a:t>
+            </a:r>
+          </a:p>
+          <a:p>
+            <a:pPr marL="336550" indent="-336550">
+              <a:spcBef>
+                <a:spcPct val="20000"/>
+              </a:spcBef>
+              <a:buClr>
+                <a:srgbClr val="00AAF6"/>
+              </a:buClr>
+              <a:buFontTx/>
+              <a:buChar char="•"/>
+            </a:pPr>
+            <a:endParaRPr lang="en-US" b="1" dirty="0"/>
+          </a:p>
+          <a:p>
+            <a:pPr marL="336550" indent="-336550">
+              <a:spcBef>
+                <a:spcPct val="20000"/>
+              </a:spcBef>
+              <a:buClr>
+                <a:srgbClr val="00AAF6"/>
+              </a:buClr>
+              <a:buFontTx/>
+              <a:buChar char="•"/>
+            </a:pPr>
+            <a:endParaRPr lang="en-US" sz="1800" b="1" dirty="0"/>
           </a:p>
         </p:txBody>
       </p:sp>
@@ -4434,28 +4574,114 @@
       </p:grpSpPr>
       <p:sp>
         <p:nvSpPr>
-          <p:cNvPr id="38914" name="Rectangle 2"/>
+          <p:cNvPr id="36866" name="Rectangle 2"/>
           <p:cNvSpPr>
             <a:spLocks noGrp="1" noChangeArrowheads="1"/>
           </p:cNvSpPr>
           <p:nvPr>
-            <p:ph type="ctrTitle"/>
-          </p:nvPr>
-        </p:nvSpPr>
-        <p:spPr>
-          <a:xfrm>
-            <a:off x="2497053" y="4029925"/>
-            <a:ext cx="4114800" cy="609600"/>
-          </a:xfrm>
-        </p:spPr>
+            <p:ph type="title"/>
+          </p:nvPr>
+        </p:nvSpPr>
+        <p:spPr/>
         <p:txBody>
           <a:bodyPr/>
           <a:lstStyle/>
           <a:p>
             <a:pPr eaLnBrk="1" hangingPunct="1"/>
             <a:r>
-              <a:rPr lang="en-US" sz="3600" dirty="0"/>
-              <a:t>Resources and Next Steps</a:t>
+              <a:rPr lang="en-US" sz="2600" dirty="0"/>
+              <a:t>Getting Started: </a:t>
+            </a:r>
+            <a:br>
+              <a:rPr lang="en-US" sz="2600" dirty="0"/>
+            </a:br>
+            <a:r>
+              <a:rPr lang="en-US" sz="2600" dirty="0"/>
+              <a:t>A Glance at the Technology</a:t>
+            </a:r>
+          </a:p>
+        </p:txBody>
+      </p:sp>
+      <p:sp>
+        <p:nvSpPr>
+          <p:cNvPr id="36867" name="Rectangle 3"/>
+          <p:cNvSpPr>
+            <a:spLocks noGrp="1" noChangeArrowheads="1"/>
+          </p:cNvSpPr>
+          <p:nvPr>
+            <p:ph idx="1"/>
+          </p:nvPr>
+        </p:nvSpPr>
+        <p:spPr/>
+        <p:txBody>
+          <a:bodyPr/>
+          <a:lstStyle/>
+          <a:p>
+            <a:pPr eaLnBrk="1" hangingPunct="1"/>
+            <a:r>
+              <a:rPr lang="en-US" sz="2000" dirty="0"/>
+              <a:t>Tool Platform: </a:t>
+            </a:r>
+            <a:r>
+              <a:rPr lang="en-US" sz="2000" b="0" dirty="0"/>
+              <a:t>Web application hosted by an institution – requires a web browser for end user access</a:t>
+            </a:r>
+            <a:br>
+              <a:rPr lang="en-US" sz="2000" b="0" dirty="0"/>
+            </a:br>
+            <a:endParaRPr lang="en-US" sz="2000" b="0" dirty="0"/>
+          </a:p>
+          <a:p>
+            <a:pPr eaLnBrk="1" hangingPunct="1"/>
+            <a:r>
+              <a:rPr lang="en-US" sz="2000" dirty="0"/>
+              <a:t>Key Prerequisites: </a:t>
+            </a:r>
+            <a:r>
+              <a:rPr lang="en-US" sz="2000" b="0" dirty="0"/>
+              <a:t>Database (Oracle or </a:t>
+            </a:r>
+            <a:r>
+              <a:rPr lang="en-US" sz="2000" b="0" dirty="0" err="1"/>
+              <a:t>Postgres</a:t>
+            </a:r>
+            <a:r>
+              <a:rPr lang="en-US" sz="2000" b="0" dirty="0"/>
+              <a:t>), Application container (Tomcat), </a:t>
+            </a:r>
+            <a:r>
+              <a:rPr lang="en-US" sz="2000" b="0" dirty="0" smtClean="0"/>
+              <a:t>Java, Graphical installer  </a:t>
+            </a:r>
+            <a:r>
+              <a:rPr lang="en-US" sz="2000" b="0" dirty="0"/>
+              <a:t/>
+            </a:r>
+            <a:br>
+              <a:rPr lang="en-US" sz="2000" b="0" dirty="0"/>
+            </a:br>
+            <a:endParaRPr lang="en-US" sz="2000" b="0" dirty="0"/>
+          </a:p>
+          <a:p>
+            <a:pPr eaLnBrk="1" hangingPunct="1"/>
+            <a:r>
+              <a:rPr lang="en-US" sz="2000" dirty="0"/>
+              <a:t>End User Readiness:  </a:t>
+            </a:r>
+            <a:r>
+              <a:rPr lang="en-US" sz="2000" b="0" dirty="0"/>
+              <a:t>Administrators installing C3PR will require familiarity with databases and web applications; users of C3PR will require basic clinical knowledge and some training/</a:t>
+            </a:r>
+            <a:r>
+              <a:rPr lang="en-US" sz="2000" b="0" dirty="0" smtClean="0"/>
+              <a:t>orientation</a:t>
+            </a:r>
+          </a:p>
+          <a:p>
+            <a:pPr lvl="1"/>
+            <a:r>
+              <a:rPr lang="en-US" sz="1600" dirty="0" smtClean="0"/>
+              <a:t>Documentation - </a:t>
             </a:r>
           </a:p>
         </p:txBody>
@@ -4494,214 +4720,29 @@
       </p:grpSpPr>
       <p:sp>
         <p:nvSpPr>
-          <p:cNvPr id="40962" name="Rectangle 2"/>
+          <p:cNvPr id="38914" name="Rectangle 2"/>
           <p:cNvSpPr>
             <a:spLocks noGrp="1" noChangeArrowheads="1"/>
           </p:cNvSpPr>
           <p:nvPr>
-            <p:ph type="title"/>
-          </p:nvPr>
-        </p:nvSpPr>
-        <p:spPr/>
+            <p:ph type="ctrTitle"/>
+          </p:nvPr>
+        </p:nvSpPr>
+        <p:spPr>
+          <a:xfrm>
+            <a:off x="2497053" y="4029925"/>
+            <a:ext cx="4114800" cy="609600"/>
+          </a:xfrm>
+        </p:spPr>
         <p:txBody>
           <a:bodyPr/>
           <a:lstStyle/>
           <a:p>
             <a:pPr eaLnBrk="1" hangingPunct="1"/>
             <a:r>
-              <a:rPr lang="en-US" sz="2600" dirty="0"/>
-              <a:t>Adopting C3PR </a:t>
-            </a:r>
-            <a:br>
-              <a:rPr lang="en-US" sz="2600" dirty="0"/>
-            </a:br>
-            <a:r>
-              <a:rPr lang="en-US" sz="2600" dirty="0"/>
-              <a:t>Release Timeline and Future Plans</a:t>
-            </a:r>
-          </a:p>
-        </p:txBody>
-      </p:sp>
-      <p:sp>
-        <p:nvSpPr>
-          <p:cNvPr id="40963" name="Rectangle 3"/>
-          <p:cNvSpPr>
-            <a:spLocks noGrp="1" noChangeArrowheads="1"/>
-          </p:cNvSpPr>
-          <p:nvPr>
-            <p:ph sz="half" idx="1"/>
-          </p:nvPr>
-        </p:nvSpPr>
-        <p:spPr>
-          <a:xfrm>
-            <a:off x="381000" y="1371600"/>
-            <a:ext cx="8382000" cy="4953000"/>
-          </a:xfrm>
-        </p:spPr>
-        <p:txBody>
-          <a:bodyPr/>
-          <a:lstStyle/>
-          <a:p>
-            <a:pPr marL="228600" indent="-228600" eaLnBrk="1" hangingPunct="1">
-              <a:buFontTx/>
-              <a:buNone/>
-            </a:pPr>
-            <a:r>
-              <a:rPr lang="en-US" sz="2000" dirty="0"/>
-              <a:t>Release Information</a:t>
-            </a:r>
-            <a:r>
-              <a:rPr lang="en-US" sz="2000" b="0" dirty="0"/>
-              <a:t/>
-            </a:r>
-            <a:br>
-              <a:rPr lang="en-US" sz="2000" b="0" dirty="0"/>
-            </a:br>
-            <a:endParaRPr lang="en-US" sz="900" b="0" dirty="0"/>
-          </a:p>
-          <a:p>
-            <a:pPr marL="228600" indent="-228600" eaLnBrk="1" hangingPunct="1"/>
-            <a:r>
-              <a:rPr lang="en-US" sz="1600" b="0" dirty="0"/>
-              <a:t>Current Version Number:  2.8</a:t>
-            </a:r>
-          </a:p>
-          <a:p>
-            <a:pPr marL="228600" indent="-228600" eaLnBrk="1" hangingPunct="1"/>
-            <a:r>
-              <a:rPr lang="en-US" sz="1600" b="0" dirty="0"/>
-              <a:t>Release Date: December 2009 </a:t>
-            </a:r>
-          </a:p>
-          <a:p>
-            <a:pPr marL="228600" indent="-228600" eaLnBrk="1" hangingPunct="1"/>
-            <a:r>
-              <a:rPr lang="en-US" sz="1600" b="0" dirty="0" err="1"/>
-              <a:t>caGrid</a:t>
-            </a:r>
-            <a:r>
-              <a:rPr lang="en-US" sz="1600" b="0" dirty="0"/>
-              <a:t> Enabled </a:t>
-            </a:r>
-          </a:p>
-          <a:p>
-            <a:pPr marL="228600" indent="-228600" eaLnBrk="1" hangingPunct="1">
-              <a:spcBef>
-                <a:spcPct val="0"/>
-              </a:spcBef>
-              <a:buFontTx/>
-              <a:buNone/>
-            </a:pPr>
-            <a:endParaRPr lang="en-US" sz="1800" b="0" dirty="0">
-              <a:solidFill>
-                <a:srgbClr val="3333FF"/>
-              </a:solidFill>
-            </a:endParaRPr>
-          </a:p>
-          <a:p>
-            <a:pPr marL="228600" indent="-228600" eaLnBrk="1" hangingPunct="1">
-              <a:spcBef>
-                <a:spcPct val="0"/>
-              </a:spcBef>
-              <a:buFontTx/>
-              <a:buNone/>
-            </a:pPr>
-            <a:r>
-              <a:rPr lang="en-US" sz="2000" dirty="0"/>
-              <a:t>Development Schedule</a:t>
-            </a:r>
-            <a:br>
-              <a:rPr lang="en-US" sz="2000" dirty="0"/>
-            </a:br>
-            <a:endParaRPr lang="en-US" sz="800" dirty="0"/>
-          </a:p>
-          <a:p>
-            <a:pPr marL="228600" indent="-228600" eaLnBrk="1" hangingPunct="1">
-              <a:spcBef>
-                <a:spcPct val="0"/>
-              </a:spcBef>
-            </a:pPr>
-            <a:r>
-              <a:rPr lang="en-US" sz="1800" b="0" dirty="0"/>
-              <a:t>Release 3.0 in May, 2010</a:t>
-            </a:r>
-          </a:p>
-          <a:p>
-            <a:pPr marL="228600" indent="-228600" eaLnBrk="1" hangingPunct="1">
-              <a:spcBef>
-                <a:spcPct val="0"/>
-              </a:spcBef>
-            </a:pPr>
-            <a:r>
-              <a:rPr lang="en-US" sz="1800" b="0" dirty="0"/>
-              <a:t>Planned enhancements include; further integration with RSS; enhanced reporting such as Summary 4; customization to fields and diseases; enhanced multi-site trial support</a:t>
-            </a:r>
-          </a:p>
-          <a:p>
-            <a:pPr marL="228600" indent="-228600" eaLnBrk="1" hangingPunct="1">
-              <a:spcBef>
-                <a:spcPct val="0"/>
-              </a:spcBef>
-            </a:pPr>
-            <a:r>
-              <a:rPr lang="en-US" sz="1800" b="0" dirty="0"/>
-              <a:t>Development is active with requirements gathering from adopters (Duke, Wake), elaborators (Mayo, CALGB, </a:t>
-            </a:r>
-            <a:r>
-              <a:rPr lang="en-US" sz="1800" b="0" dirty="0" err="1"/>
-              <a:t>Westat</a:t>
-            </a:r>
-            <a:r>
-              <a:rPr lang="en-US" sz="1800" b="0" dirty="0"/>
-              <a:t>), </a:t>
-            </a:r>
-            <a:r>
-              <a:rPr lang="en-US" sz="1800" b="0" dirty="0" err="1"/>
-              <a:t>caBIG</a:t>
-            </a:r>
-            <a:r>
-              <a:rPr lang="en-US" sz="1800" b="0" dirty="0"/>
-              <a:t>, and the cancer research community</a:t>
-            </a:r>
-          </a:p>
-          <a:p>
-            <a:pPr marL="228600" indent="-228600" eaLnBrk="1" hangingPunct="1">
-              <a:spcBef>
-                <a:spcPct val="0"/>
-              </a:spcBef>
-            </a:pPr>
-            <a:endParaRPr lang="en-US" sz="1800" b="0" dirty="0"/>
-          </a:p>
-          <a:p>
-            <a:pPr marL="228600" indent="-228600" eaLnBrk="1" hangingPunct="1">
-              <a:spcBef>
-                <a:spcPct val="0"/>
-              </a:spcBef>
-              <a:buFontTx/>
-              <a:buNone/>
-            </a:pPr>
-            <a:r>
-              <a:rPr lang="en-US" sz="1800" dirty="0"/>
-              <a:t>Support Available</a:t>
-            </a:r>
-            <a:br>
-              <a:rPr lang="en-US" sz="1800" dirty="0"/>
-            </a:br>
-            <a:endParaRPr lang="en-US" sz="900" dirty="0"/>
-          </a:p>
-          <a:p>
-            <a:pPr marL="228600" indent="-228600" eaLnBrk="1" hangingPunct="1">
-              <a:spcBef>
-                <a:spcPct val="0"/>
-              </a:spcBef>
-            </a:pPr>
-            <a:r>
-              <a:rPr lang="en-US" sz="1600" b="0" dirty="0">
-                <a:hlinkClick r:id="rId3"/>
-              </a:rPr>
-              <a:t>ncicb@pop.nci.nih.gov</a:t>
-            </a:r>
-            <a:endParaRPr lang="en-US" sz="1600" b="0" dirty="0"/>
+              <a:rPr lang="en-US" sz="3600" dirty="0"/>
+              <a:t>Resources and Next Steps</a:t>
+            </a:r>
           </a:p>
         </p:txBody>
       </p:sp>
@@ -4721,6 +4762,263 @@
 </file>
 
 <file path=ppt/slides/slide13.xml><?xml version="1.0" encoding="utf-8"?>
+<p:sld xmlns:a="http://schemas.openxmlformats.org/drawingml/2006/main" xmlns:r="http://schemas.openxmlformats.org/officeDocument/2006/relationships" xmlns:mc="http://schemas.openxmlformats.org/markup-compatibility/2006" xmlns:mv="urn:schemas-microsoft-com:mac:vml" xmlns:p="http://schemas.openxmlformats.org/presentationml/2006/main" mc:Ignorable="mv" mc:PreserveAttributes="mv:*">
+  <p:cSld>
+    <p:spTree>
+      <p:nvGrpSpPr>
+        <p:cNvPr id="1" name=""/>
+        <p:cNvGrpSpPr/>
+        <p:nvPr/>
+      </p:nvGrpSpPr>
+      <p:grpSpPr>
+        <a:xfrm>
+          <a:off x="0" y="0"/>
+          <a:ext cx="0" cy="0"/>
+          <a:chOff x="0" y="0"/>
+          <a:chExt cx="0" cy="0"/>
+        </a:xfrm>
+      </p:grpSpPr>
+      <p:sp>
+        <p:nvSpPr>
+          <p:cNvPr id="40962" name="Rectangle 2"/>
+          <p:cNvSpPr>
+            <a:spLocks noGrp="1" noChangeArrowheads="1"/>
+          </p:cNvSpPr>
+          <p:nvPr>
+            <p:ph type="title"/>
+          </p:nvPr>
+        </p:nvSpPr>
+        <p:spPr/>
+        <p:txBody>
+          <a:bodyPr/>
+          <a:lstStyle/>
+          <a:p>
+            <a:pPr eaLnBrk="1" hangingPunct="1"/>
+            <a:r>
+              <a:rPr lang="en-US" sz="2600" dirty="0"/>
+              <a:t>Adopting C3PR </a:t>
+            </a:r>
+            <a:br>
+              <a:rPr lang="en-US" sz="2600" dirty="0"/>
+            </a:br>
+            <a:r>
+              <a:rPr lang="en-US" sz="2600" dirty="0"/>
+              <a:t>Release Timeline and Future Plans</a:t>
+            </a:r>
+          </a:p>
+        </p:txBody>
+      </p:sp>
+      <p:sp>
+        <p:nvSpPr>
+          <p:cNvPr id="40963" name="Rectangle 3"/>
+          <p:cNvSpPr>
+            <a:spLocks noGrp="1" noChangeArrowheads="1"/>
+          </p:cNvSpPr>
+          <p:nvPr>
+            <p:ph sz="half" idx="1"/>
+          </p:nvPr>
+        </p:nvSpPr>
+        <p:spPr>
+          <a:xfrm>
+            <a:off x="381000" y="1371600"/>
+            <a:ext cx="8382000" cy="4953000"/>
+          </a:xfrm>
+        </p:spPr>
+        <p:txBody>
+          <a:bodyPr/>
+          <a:lstStyle/>
+          <a:p>
+            <a:pPr marL="228600" indent="-228600" eaLnBrk="1" hangingPunct="1">
+              <a:buFontTx/>
+              <a:buNone/>
+            </a:pPr>
+            <a:r>
+              <a:rPr lang="en-US" sz="2000" dirty="0"/>
+              <a:t>Release Information</a:t>
+            </a:r>
+            <a:r>
+              <a:rPr lang="en-US" sz="2000" b="0" dirty="0"/>
+              <a:t/>
+            </a:r>
+            <a:br>
+              <a:rPr lang="en-US" sz="2000" b="0" dirty="0"/>
+            </a:br>
+            <a:endParaRPr lang="en-US" sz="900" b="0" dirty="0"/>
+          </a:p>
+          <a:p>
+            <a:pPr marL="228600" indent="-228600" eaLnBrk="1" hangingPunct="1"/>
+            <a:r>
+              <a:rPr lang="en-US" sz="1600" b="0" dirty="0"/>
+              <a:t>Current Version Number:  2.8</a:t>
+            </a:r>
+          </a:p>
+          <a:p>
+            <a:pPr marL="228600" indent="-228600" eaLnBrk="1" hangingPunct="1"/>
+            <a:r>
+              <a:rPr lang="en-US" sz="1600" b="0" dirty="0"/>
+              <a:t>Release Date: December 2009 </a:t>
+            </a:r>
+          </a:p>
+          <a:p>
+            <a:pPr marL="228600" indent="-228600" eaLnBrk="1" hangingPunct="1"/>
+            <a:r>
+              <a:rPr lang="en-US" sz="1600" b="0" dirty="0" err="1"/>
+              <a:t>caGrid</a:t>
+            </a:r>
+            <a:r>
+              <a:rPr lang="en-US" sz="1600" b="0" dirty="0"/>
+              <a:t> Enabled </a:t>
+            </a:r>
+          </a:p>
+          <a:p>
+            <a:pPr marL="228600" indent="-228600" eaLnBrk="1" hangingPunct="1">
+              <a:spcBef>
+                <a:spcPct val="0"/>
+              </a:spcBef>
+              <a:buFontTx/>
+              <a:buNone/>
+            </a:pPr>
+            <a:endParaRPr lang="en-US" sz="1800" b="0" dirty="0">
+              <a:solidFill>
+                <a:srgbClr val="3333FF"/>
+              </a:solidFill>
+            </a:endParaRPr>
+          </a:p>
+          <a:p>
+            <a:pPr marL="228600" indent="-228600" eaLnBrk="1" hangingPunct="1">
+              <a:spcBef>
+                <a:spcPct val="0"/>
+              </a:spcBef>
+              <a:buFontTx/>
+              <a:buNone/>
+            </a:pPr>
+            <a:r>
+              <a:rPr lang="en-US" sz="2000" dirty="0"/>
+              <a:t>Development Schedule</a:t>
+            </a:r>
+            <a:br>
+              <a:rPr lang="en-US" sz="2000" dirty="0"/>
+            </a:br>
+            <a:endParaRPr lang="en-US" sz="800" dirty="0"/>
+          </a:p>
+          <a:p>
+            <a:pPr marL="228600" indent="-228600" eaLnBrk="1" hangingPunct="1">
+              <a:spcBef>
+                <a:spcPct val="0"/>
+              </a:spcBef>
+            </a:pPr>
+            <a:r>
+              <a:rPr lang="en-US" sz="1800" b="0" dirty="0"/>
+              <a:t>Release 3.0 in May, 2010</a:t>
+            </a:r>
+          </a:p>
+          <a:p>
+            <a:pPr marL="228600" indent="-228600" eaLnBrk="1" hangingPunct="1">
+              <a:spcBef>
+                <a:spcPct val="0"/>
+              </a:spcBef>
+            </a:pPr>
+            <a:r>
+              <a:rPr lang="en-US" sz="1800" b="0" dirty="0"/>
+              <a:t>Planned enhancements include; further integration with RSS; enhanced reporting such as Summary 4; customization to fields and diseases; enhanced multi-site trial support</a:t>
+            </a:r>
+          </a:p>
+          <a:p>
+            <a:pPr marL="228600" indent="-228600" eaLnBrk="1" hangingPunct="1">
+              <a:spcBef>
+                <a:spcPct val="0"/>
+              </a:spcBef>
+            </a:pPr>
+            <a:r>
+              <a:rPr lang="en-US" sz="1800" b="0" dirty="0"/>
+              <a:t>Development is active with requirements gathering from adopters (Duke, </a:t>
+            </a:r>
+            <a:r>
+              <a:rPr lang="en-US" sz="1800" b="0" dirty="0" smtClean="0"/>
+              <a:t>Wake Forest, UAMS, Lombardi Cancer Center)</a:t>
+            </a:r>
+            <a:r>
+              <a:rPr lang="en-US" sz="1800" b="0" dirty="0"/>
+              <a:t>, elaborators (Mayo, CALGB, </a:t>
+            </a:r>
+            <a:r>
+              <a:rPr lang="en-US" sz="1800" b="0" dirty="0" err="1"/>
+              <a:t>Westat</a:t>
+            </a:r>
+            <a:r>
+              <a:rPr lang="en-US" sz="1800" b="0" dirty="0"/>
+              <a:t>), </a:t>
+            </a:r>
+            <a:r>
+              <a:rPr lang="en-US" sz="1800" b="0" dirty="0" err="1"/>
+              <a:t>caBIG</a:t>
+            </a:r>
+            <a:r>
+              <a:rPr lang="en-US" sz="1800" b="0" dirty="0"/>
+              <a:t>, and the cancer research </a:t>
+            </a:r>
+            <a:r>
+              <a:rPr lang="en-US" sz="1800" b="0" dirty="0" smtClean="0"/>
+              <a:t>community</a:t>
+            </a:r>
+          </a:p>
+          <a:p>
+            <a:pPr marL="228600" indent="-228600" eaLnBrk="1" hangingPunct="1">
+              <a:spcBef>
+                <a:spcPct val="0"/>
+              </a:spcBef>
+            </a:pPr>
+            <a:endParaRPr lang="en-US" sz="1800" b="0" dirty="0"/>
+          </a:p>
+          <a:p>
+            <a:pPr marL="228600" indent="-228600" eaLnBrk="1" hangingPunct="1">
+              <a:spcBef>
+                <a:spcPct val="0"/>
+              </a:spcBef>
+              <a:buFontTx/>
+              <a:buNone/>
+            </a:pPr>
+            <a:r>
+              <a:rPr lang="en-US" sz="1800" dirty="0"/>
+              <a:t>Support Available</a:t>
+            </a:r>
+            <a:br>
+              <a:rPr lang="en-US" sz="1800" dirty="0"/>
+            </a:br>
+            <a:endParaRPr lang="en-US" sz="900" dirty="0"/>
+          </a:p>
+          <a:p>
+            <a:pPr marL="228600" indent="-228600" eaLnBrk="1" hangingPunct="1">
+              <a:spcBef>
+                <a:spcPct val="0"/>
+              </a:spcBef>
+            </a:pPr>
+            <a:r>
+              <a:rPr lang="en-US" sz="1600" b="0" dirty="0">
+                <a:hlinkClick r:id="rId3"/>
+              </a:rPr>
+              <a:t>ncicb@pop.nci.nih.gov</a:t>
+            </a:r>
+            <a:endParaRPr lang="en-US" sz="1600" b="0" dirty="0"/>
+          </a:p>
+        </p:txBody>
+      </p:sp>
+    </p:spTree>
+  </p:cSld>
+  <p:clrMapOvr>
+    <a:masterClrMapping/>
+  </p:clrMapOvr>
+  <p:timing>
+    <p:tnLst>
+      <p:par>
+        <p:cTn id="1" dur="indefinite" restart="never" nodeType="tmRoot"/>
+      </p:par>
+    </p:tnLst>
+  </p:timing>
+</p:sld>
+</file>
+
+<file path=ppt/slides/slide14.xml><?xml version="1.0" encoding="utf-8"?>
 <p:sld xmlns:a="http://schemas.openxmlformats.org/drawingml/2006/main" xmlns:r="http://schemas.openxmlformats.org/officeDocument/2006/relationships" xmlns:mc="http://schemas.openxmlformats.org/markup-compatibility/2006" xmlns:mv="urn:schemas-microsoft-com:mac:vml" xmlns:p="http://schemas.openxmlformats.org/presentationml/2006/main" mc:Ignorable="mv" mc:PreserveAttributes="mv:*">
   <p:cSld>
     <p:spTree>
@@ -6253,28 +6551,36 @@
           <a:p>
             <a:pPr eaLnBrk="1" hangingPunct="1"/>
             <a:r>
-              <a:rPr lang="en-US" sz="2000"/>
+              <a:rPr lang="en-US" sz="2000" dirty="0"/>
               <a:t>C3PR Release 1</a:t>
             </a:r>
           </a:p>
           <a:p>
             <a:pPr lvl="1" eaLnBrk="1" hangingPunct="1"/>
             <a:r>
-              <a:rPr lang="en-US" sz="2000"/>
+              <a:rPr lang="en-US" sz="2000" dirty="0"/>
               <a:t>Developed by Nortel Solutions</a:t>
             </a:r>
           </a:p>
           <a:p>
             <a:pPr lvl="1" eaLnBrk="1" hangingPunct="1"/>
             <a:r>
-              <a:rPr lang="en-US" sz="2000"/>
-              <a:t>Baseline functionality for registering patients to pre-defined protocols</a:t>
+              <a:rPr lang="en-US" sz="2000" dirty="0"/>
+              <a:t>Baseline </a:t>
+            </a:r>
+            <a:r>
+              <a:rPr lang="en-US" sz="2000" dirty="0" smtClean="0"/>
+              <a:t>functionalities </a:t>
+            </a:r>
+            <a:r>
+              <a:rPr lang="en-US" sz="2000" dirty="0"/>
+              <a:t>for registering patients to pre-defined protocols</a:t>
             </a:r>
           </a:p>
           <a:p>
             <a:pPr lvl="1" eaLnBrk="1" hangingPunct="1"/>
             <a:r>
-              <a:rPr lang="en-US" sz="2000"/>
+              <a:rPr lang="en-US" sz="2000" dirty="0"/>
               <a:t>Released for testing in 2004, production in 2006</a:t>
             </a:r>
           </a:p>
@@ -6283,47 +6589,60 @@
               <a:buFontTx/>
               <a:buNone/>
             </a:pPr>
-            <a:endParaRPr lang="en-US" sz="2000"/>
+            <a:endParaRPr lang="en-US" sz="2000" dirty="0"/>
           </a:p>
           <a:p>
             <a:pPr eaLnBrk="1" hangingPunct="1"/>
             <a:r>
-              <a:rPr lang="en-US" sz="2000" b="0"/>
+              <a:rPr lang="en-US" sz="2000" b="0" dirty="0"/>
               <a:t> </a:t>
             </a:r>
             <a:r>
-              <a:rPr lang="en-US" sz="2000"/>
+              <a:rPr lang="en-US" sz="2000" dirty="0"/>
               <a:t>C3PR Release 2</a:t>
             </a:r>
-            <a:endParaRPr lang="en-US" sz="2000" b="0"/>
+            <a:endParaRPr lang="en-US" sz="2000" b="0" dirty="0"/>
           </a:p>
           <a:p>
             <a:pPr lvl="1" eaLnBrk="1" hangingPunct="1"/>
             <a:r>
-              <a:rPr lang="en-US" sz="2000"/>
+              <a:rPr lang="en-US" sz="2000" dirty="0"/>
               <a:t>Developed by Duke Comprehensive Cancer Center</a:t>
             </a:r>
           </a:p>
           <a:p>
             <a:pPr lvl="1" eaLnBrk="1" hangingPunct="1"/>
             <a:r>
-              <a:rPr lang="en-US" sz="2000"/>
+              <a:rPr lang="en-US" sz="2000" dirty="0"/>
               <a:t>Extends the Release 1 functionality</a:t>
             </a:r>
           </a:p>
           <a:p>
             <a:pPr lvl="1" eaLnBrk="1" hangingPunct="1"/>
             <a:r>
-              <a:rPr lang="en-US" sz="2000"/>
+              <a:rPr lang="en-US" sz="2000" dirty="0"/>
               <a:t>Project began in November 2006, production in 2008</a:t>
             </a:r>
           </a:p>
           <a:p>
             <a:pPr lvl="1" eaLnBrk="1" hangingPunct="1"/>
             <a:r>
-              <a:rPr lang="en-US" sz="2000"/>
-              <a:t>Release 2.8 to be included with caBIG Clinical Trials Suite (CCTS) 2.0</a:t>
-            </a:r>
+              <a:rPr lang="en-US" sz="2000" dirty="0"/>
+              <a:t>Release 2.8 to be included with </a:t>
+            </a:r>
+            <a:r>
+              <a:rPr lang="en-US" sz="2000" dirty="0" err="1"/>
+              <a:t>caBIG</a:t>
+            </a:r>
+            <a:r>
+              <a:rPr lang="en-US" sz="2000" dirty="0"/>
+              <a:t> Clinical Trials Suite (CCTS) </a:t>
+            </a:r>
+            <a:r>
+              <a:rPr lang="en-US" sz="2000" dirty="0" smtClean="0"/>
+              <a:t>2.0 – December 14, 2009</a:t>
+            </a:r>
+            <a:endParaRPr lang="en-US" sz="2000" dirty="0"/>
           </a:p>
         </p:txBody>
       </p:sp>
@@ -6727,8 +7046,8 @@
         </p:nvSpPr>
         <p:spPr bwMode="auto">
           <a:xfrm>
-            <a:off x="6867525" y="4981575"/>
-            <a:ext cx="1817688" cy="276225"/>
+            <a:off x="6958238" y="4981575"/>
+            <a:ext cx="1929735" cy="276999"/>
           </a:xfrm>
           <a:prstGeom prst="rect">
             <a:avLst/>
@@ -6751,9 +7070,14 @@
           <a:lstStyle/>
           <a:p>
             <a:r>
-              <a:rPr lang="en-US" sz="1200"/>
-              <a:t>Clinical data is captured</a:t>
-            </a:r>
+              <a:rPr lang="en-US" sz="1200" dirty="0"/>
+              <a:t>Clinical </a:t>
+            </a:r>
+            <a:r>
+              <a:rPr lang="en-US" sz="1200" dirty="0" smtClean="0"/>
+              <a:t>data are captured</a:t>
+            </a:r>
+            <a:endParaRPr lang="en-US" sz="1200" dirty="0"/>
           </a:p>
         </p:txBody>
       </p:sp>
@@ -7634,9 +7958,12 @@
             <a:pPr lvl="1" eaLnBrk="1" hangingPunct="1"/>
             <a:r>
               <a:rPr lang="en-US" sz="2000" u="sng" dirty="0"/>
-              <a:t>Site Coordinators: monitor all study site activity </a:t>
-            </a:r>
-            <a:endParaRPr lang="en-US" sz="2000" dirty="0"/>
+              <a:t>Site Coordinators</a:t>
+            </a:r>
+            <a:r>
+              <a:rPr lang="en-US" sz="2000" dirty="0"/>
+              <a:t>: monitor all study site activity </a:t>
+            </a:r>
           </a:p>
           <a:p>
             <a:pPr lvl="1" eaLnBrk="1" hangingPunct="1"/>
@@ -7784,15 +8111,7 @@
                   <a:schemeClr val="accent2"/>
                 </a:solidFill>
               </a:rPr>
-              <a:t>Benefits of Using </a:t>
-            </a:r>
-            <a:r>
-              <a:rPr lang="en-US" sz="2600" smtClean="0">
-                <a:solidFill>
-                  <a:schemeClr val="accent2"/>
-                </a:solidFill>
-              </a:rPr>
-              <a:t>C3PR </a:t>
+              <a:t>Benefits of Using C3PR </a:t>
             </a:r>
             <a:endParaRPr lang="en-US" sz="2600" dirty="0">
               <a:solidFill>
@@ -7822,7 +8141,7 @@
                 <a:spcPct val="80000"/>
               </a:lnSpc>
             </a:pPr>
-            <a:endParaRPr lang="en-US" sz="2400" smtClean="0"/>
+            <a:endParaRPr lang="en-US" sz="2400" dirty="0" smtClean="0"/>
           </a:p>
           <a:p>
             <a:pPr eaLnBrk="1" hangingPunct="1">
@@ -7831,7 +8150,7 @@
               </a:lnSpc>
             </a:pPr>
             <a:r>
-              <a:rPr lang="en-US" sz="2800" smtClean="0"/>
+              <a:rPr lang="en-US" sz="2800" dirty="0" smtClean="0"/>
               <a:t>Subject Management</a:t>
             </a:r>
           </a:p>
@@ -7844,11 +8163,11 @@
               <a:buNone/>
             </a:pPr>
             <a:r>
-              <a:rPr lang="en-US" sz="2000" i="1" smtClean="0"/>
+              <a:rPr lang="en-US" sz="2000" i="1" dirty="0" smtClean="0"/>
               <a:t>Participating patients</a:t>
             </a:r>
             <a:r>
-              <a:rPr lang="en-US" smtClean="0"/>
+              <a:rPr lang="en-US" dirty="0" smtClean="0"/>
               <a:t> </a:t>
             </a:r>
           </a:p>
@@ -7859,7 +8178,7 @@
               </a:lnSpc>
             </a:pPr>
             <a:r>
-              <a:rPr lang="en-US" sz="2800" smtClean="0"/>
+              <a:rPr lang="en-US" sz="2800" dirty="0" smtClean="0"/>
               <a:t>Protocol Management</a:t>
             </a:r>
           </a:p>
@@ -7872,11 +8191,11 @@
               <a:buNone/>
             </a:pPr>
             <a:r>
-              <a:rPr lang="en-US" sz="2000" i="1" smtClean="0"/>
+              <a:rPr lang="en-US" sz="2000" i="1" dirty="0" smtClean="0"/>
               <a:t>Study structure, diseases, notifications, blinded studies, companion studies, amendments</a:t>
             </a:r>
             <a:r>
-              <a:rPr lang="en-US" smtClean="0"/>
+              <a:rPr lang="en-US" dirty="0" smtClean="0"/>
               <a:t> </a:t>
             </a:r>
           </a:p>
@@ -7887,7 +8206,7 @@
               </a:lnSpc>
             </a:pPr>
             <a:r>
-              <a:rPr lang="en-US" sz="2800" smtClean="0"/>
+              <a:rPr lang="en-US" sz="2800" dirty="0" smtClean="0"/>
               <a:t>Registration Management </a:t>
             </a:r>
           </a:p>
@@ -7900,10 +8219,14 @@
               <a:buNone/>
             </a:pPr>
             <a:r>
-              <a:rPr lang="en-US" sz="2000" i="1" smtClean="0"/>
-              <a:t>Consent, eligibility, stratification, randomization, screening, enrollment</a:t>
-            </a:r>
-            <a:endParaRPr lang="en-US" smtClean="0"/>
+              <a:rPr lang="en-US" sz="2000" i="1" dirty="0" smtClean="0"/>
+              <a:t>Consent, eligibility, stratification, randomization, screening, </a:t>
+            </a:r>
+            <a:r>
+              <a:rPr lang="en-US" sz="2000" i="1" dirty="0" smtClean="0"/>
+              <a:t>enrollment, back-dated registration</a:t>
+            </a:r>
+            <a:endParaRPr lang="en-US" dirty="0" smtClean="0"/>
           </a:p>
           <a:p>
             <a:pPr eaLnBrk="1" hangingPunct="1">
@@ -7912,7 +8235,7 @@
               </a:lnSpc>
             </a:pPr>
             <a:r>
-              <a:rPr lang="en-US" sz="2800" smtClean="0"/>
+              <a:rPr lang="en-US" sz="2800" dirty="0" smtClean="0"/>
               <a:t>Reporting</a:t>
             </a:r>
           </a:p>
@@ -7925,8 +8248,12 @@
               <a:buNone/>
             </a:pPr>
             <a:r>
-              <a:rPr lang="en-US" sz="2000" i="1" smtClean="0"/>
-              <a:t>Registrations, protocols</a:t>
+              <a:rPr lang="en-US" sz="2000" i="1" dirty="0" smtClean="0"/>
+              <a:t>Registrations, </a:t>
+            </a:r>
+            <a:r>
+              <a:rPr lang="en-US" sz="2000" i="1" dirty="0" smtClean="0"/>
+              <a:t>protocols, Summary 3</a:t>
             </a:r>
           </a:p>
           <a:p>
@@ -7937,7 +8264,7 @@
               <a:buFontTx/>
               <a:buNone/>
             </a:pPr>
-            <a:endParaRPr lang="en-US" sz="2000" i="1" smtClean="0"/>
+            <a:endParaRPr lang="en-US" sz="2000" i="1" dirty="0" smtClean="0"/>
           </a:p>
           <a:p>
             <a:pPr eaLnBrk="1" hangingPunct="1">
@@ -7945,7 +8272,7 @@
                 <a:spcPct val="80000"/>
               </a:lnSpc>
             </a:pPr>
-            <a:endParaRPr lang="en-US" sz="2800" i="1" smtClean="0"/>
+            <a:endParaRPr lang="en-US" sz="2800" i="1" dirty="0" smtClean="0"/>
           </a:p>
           <a:p>
             <a:pPr eaLnBrk="1" hangingPunct="1">
@@ -7953,7 +8280,7 @@
                 <a:spcPct val="80000"/>
               </a:lnSpc>
             </a:pPr>
-            <a:endParaRPr lang="en-US" sz="2400" b="0" smtClean="0"/>
+            <a:endParaRPr lang="en-US" sz="2400" b="0" dirty="0" smtClean="0"/>
           </a:p>
           <a:p>
             <a:pPr eaLnBrk="1" hangingPunct="1">
@@ -7963,7 +8290,7 @@
               <a:buFontTx/>
               <a:buNone/>
             </a:pPr>
-            <a:endParaRPr lang="en-US" b="0" smtClean="0"/>
+            <a:endParaRPr lang="en-US" b="0" dirty="0" smtClean="0"/>
           </a:p>
           <a:p>
             <a:pPr eaLnBrk="1" hangingPunct="1">
@@ -7971,7 +8298,7 @@
                 <a:spcPct val="80000"/>
               </a:lnSpc>
             </a:pPr>
-            <a:endParaRPr lang="en-US" b="0" smtClean="0"/>
+            <a:endParaRPr lang="en-US" b="0" dirty="0" smtClean="0"/>
           </a:p>
           <a:p>
             <a:pPr eaLnBrk="1" hangingPunct="1">
@@ -7981,7 +8308,7 @@
               <a:buFontTx/>
               <a:buNone/>
             </a:pPr>
-            <a:endParaRPr lang="en-US" sz="2400" smtClean="0"/>
+            <a:endParaRPr lang="en-US" sz="2400" dirty="0" smtClean="0"/>
           </a:p>
           <a:p>
             <a:pPr eaLnBrk="1" hangingPunct="1">
@@ -7989,7 +8316,7 @@
                 <a:spcPct val="80000"/>
               </a:lnSpc>
             </a:pPr>
-            <a:endParaRPr lang="en-US" sz="2400" smtClean="0"/>
+            <a:endParaRPr lang="en-US" sz="2400" dirty="0" smtClean="0"/>
           </a:p>
           <a:p>
             <a:pPr eaLnBrk="1" hangingPunct="1">
@@ -7997,7 +8324,7 @@
                 <a:spcPct val="80000"/>
               </a:lnSpc>
             </a:pPr>
-            <a:endParaRPr lang="en-US" sz="2800" b="0" smtClean="0"/>
+            <a:endParaRPr lang="en-US" sz="2800" b="0" dirty="0" smtClean="0"/>
           </a:p>
         </p:txBody>
       </p:sp>
@@ -8035,9 +8362,9 @@
       </p:grpSpPr>
       <p:sp>
         <p:nvSpPr>
-          <p:cNvPr id="30722" name="Rectangle 2"/>
-          <p:cNvSpPr>
-            <a:spLocks noGrp="1" noChangeArrowheads="1"/>
+          <p:cNvPr id="2" name="Title 1"/>
+          <p:cNvSpPr>
+            <a:spLocks noGrp="1"/>
           </p:cNvSpPr>
           <p:nvPr>
             <p:ph type="title"/>
@@ -8048,14 +8375,21 @@
           <a:bodyPr/>
           <a:lstStyle/>
           <a:p>
-            <a:pPr eaLnBrk="1" hangingPunct="1"/>
-            <a:r>
-              <a:rPr lang="en-US" sz="2600" dirty="0">
+            <a:r>
+              <a:rPr lang="en-US" sz="2600" dirty="0" smtClean="0">
                 <a:solidFill>
                   <a:schemeClr val="accent2"/>
                 </a:solidFill>
               </a:rPr>
-              <a:t>More on How C3PR Benefits Your Research</a:t>
+              <a:t>Additional Benefits </a:t>
+            </a:r>
+            <a:r>
+              <a:rPr lang="en-US" sz="2600" dirty="0" smtClean="0">
+                <a:solidFill>
+                  <a:schemeClr val="accent2"/>
+                </a:solidFill>
+              </a:rPr>
+              <a:t>of Using C3PR </a:t>
             </a:r>
             <a:endParaRPr lang="en-US" sz="2600" dirty="0"/>
           </a:p>
@@ -8063,135 +8397,39 @@
       </p:sp>
       <p:sp>
         <p:nvSpPr>
-          <p:cNvPr id="30723" name="Rectangle 3"/>
-          <p:cNvSpPr>
-            <a:spLocks noGrp="1" noChangeArrowheads="1"/>
+          <p:cNvPr id="3" name="Content Placeholder 2"/>
+          <p:cNvSpPr>
+            <a:spLocks noGrp="1"/>
           </p:cNvSpPr>
           <p:nvPr>
             <p:ph idx="1"/>
           </p:nvPr>
         </p:nvSpPr>
-        <p:spPr>
-          <a:xfrm>
-            <a:off x="228600" y="1143000"/>
-            <a:ext cx="8610600" cy="5486400"/>
-          </a:xfrm>
-        </p:spPr>
+        <p:spPr/>
         <p:txBody>
           <a:bodyPr/>
           <a:lstStyle/>
           <a:p>
-            <a:pPr eaLnBrk="1" hangingPunct="1"/>
-            <a:r>
-              <a:rPr lang="en-US" sz="2400" dirty="0">
-                <a:solidFill>
-                  <a:srgbClr val="008000"/>
-                </a:solidFill>
-              </a:rPr>
-              <a:t>Integrate</a:t>
-            </a:r>
-            <a:r>
-              <a:rPr lang="en-US" sz="2400" dirty="0"/>
-              <a:t> with other clinical systems</a:t>
-            </a:r>
-          </a:p>
-          <a:p>
-            <a:pPr eaLnBrk="1" hangingPunct="1">
-              <a:buFontTx/>
-              <a:buNone/>
-            </a:pPr>
-            <a:endParaRPr lang="en-US" sz="2400" dirty="0"/>
-          </a:p>
-          <a:p>
-            <a:pPr lvl="1" eaLnBrk="1" hangingPunct="1"/>
-            <a:r>
-              <a:rPr lang="en-US" sz="2400" b="1" dirty="0" err="1"/>
-              <a:t>caBIG</a:t>
-            </a:r>
-            <a:r>
-              <a:rPr lang="en-US" sz="2400" b="1" dirty="0"/>
-              <a:t> Clinical Trials </a:t>
-            </a:r>
-            <a:r>
-              <a:rPr lang="en-US" sz="2400" b="1" dirty="0" smtClean="0"/>
-              <a:t>Suite (CCTS)</a:t>
-            </a:r>
-          </a:p>
-          <a:p>
-            <a:pPr lvl="2" eaLnBrk="1" hangingPunct="1"/>
-            <a:r>
-              <a:rPr lang="en-US" sz="2200" dirty="0"/>
-              <a:t>Patient Study Calendar (PSC)</a:t>
-            </a:r>
-          </a:p>
-          <a:p>
-            <a:pPr lvl="2" eaLnBrk="1" hangingPunct="1"/>
-            <a:r>
-              <a:rPr lang="en-US" sz="2200" dirty="0"/>
-              <a:t>Cancer Adverse Events Reporting System (</a:t>
-            </a:r>
-            <a:r>
-              <a:rPr lang="en-US" sz="2200" dirty="0" err="1"/>
-              <a:t>caAERS</a:t>
-            </a:r>
-            <a:r>
-              <a:rPr lang="en-US" sz="2200" dirty="0"/>
-              <a:t>)</a:t>
-            </a:r>
-          </a:p>
-          <a:p>
-            <a:pPr lvl="2" eaLnBrk="1" hangingPunct="1"/>
-            <a:r>
-              <a:rPr lang="en-US" sz="2200" dirty="0"/>
-              <a:t>Cancer Central Clinical Database (C3D)</a:t>
-            </a:r>
-          </a:p>
-          <a:p>
-            <a:pPr lvl="2" eaLnBrk="1" hangingPunct="1"/>
-            <a:r>
-              <a:rPr lang="en-US" sz="2200" dirty="0" err="1"/>
-              <a:t>LabViewer</a:t>
-            </a:r>
-            <a:r>
-              <a:rPr lang="en-US" sz="2200" dirty="0"/>
-              <a:t> / Clinical Trial Object Data System (CTODS)</a:t>
-            </a:r>
-            <a:endParaRPr lang="en-US" sz="2400" b="1" dirty="0"/>
-          </a:p>
-          <a:p>
-            <a:pPr lvl="1" eaLnBrk="1" hangingPunct="1"/>
-            <a:r>
-              <a:rPr lang="en-US" sz="2400" b="1" dirty="0"/>
-              <a:t>Multi-site Trials</a:t>
-            </a:r>
-          </a:p>
-          <a:p>
-            <a:pPr lvl="2" eaLnBrk="1" hangingPunct="1"/>
-            <a:r>
-              <a:rPr lang="en-US" sz="2200" dirty="0"/>
-              <a:t>Coordinating site shares study definition with affiliate sites</a:t>
-            </a:r>
-          </a:p>
-          <a:p>
-            <a:pPr lvl="2" eaLnBrk="1" hangingPunct="1"/>
-            <a:r>
-              <a:rPr lang="en-US" sz="2200" dirty="0"/>
-              <a:t>Affiliate sites exchange registration information</a:t>
-            </a:r>
-          </a:p>
-          <a:p>
-            <a:pPr lvl="1" eaLnBrk="1" hangingPunct="1"/>
-            <a:r>
-              <a:rPr lang="en-US" sz="2400" b="1" dirty="0"/>
-              <a:t>NCI Enterprise Services</a:t>
-            </a:r>
-          </a:p>
-          <a:p>
-            <a:pPr lvl="2" eaLnBrk="1" hangingPunct="1"/>
-            <a:r>
-              <a:rPr lang="en-US" sz="2200" dirty="0"/>
-              <a:t>Access to Clinical Trials Reporting Program (CTRP) data, such as protocols, persons and organizations</a:t>
-            </a:r>
+            <a:r>
+              <a:rPr lang="en-US" dirty="0" smtClean="0"/>
+              <a:t>Supports complex protocols, such as companion studies with randomization</a:t>
+            </a:r>
+          </a:p>
+          <a:p>
+            <a:r>
+              <a:rPr lang="en-US" dirty="0" smtClean="0"/>
+              <a:t>Custom notifications feature</a:t>
+            </a:r>
+          </a:p>
+          <a:p>
+            <a:pPr lvl="1"/>
+            <a:r>
+              <a:rPr lang="en-US" dirty="0" smtClean="0"/>
+              <a:t>Example - notifications may be sent to all users with a particular role (registrars, study coordinators, site coordinators)</a:t>
+            </a:r>
+          </a:p>
+          <a:p>
+            <a:endParaRPr lang="en-US" dirty="0" smtClean="0"/>
           </a:p>
         </p:txBody>
       </p:sp>
@@ -8200,13 +8438,6 @@
   <p:clrMapOvr>
     <a:masterClrMapping/>
   </p:clrMapOvr>
-  <p:timing>
-    <p:tnLst>
-      <p:par>
-        <p:cTn id="1" dur="indefinite" restart="never" nodeType="tmRoot"/>
-      </p:par>
-    </p:tnLst>
-  </p:timing>
 </p:sld>
 </file>
 
@@ -8229,18 +8460,46 @@
       </p:grpSpPr>
       <p:sp>
         <p:nvSpPr>
-          <p:cNvPr id="32770" name="Rectangle 2"/>
+          <p:cNvPr id="30722" name="Rectangle 2"/>
           <p:cNvSpPr>
             <a:spLocks noGrp="1" noChangeArrowheads="1"/>
           </p:cNvSpPr>
           <p:nvPr>
-            <p:ph type="ctrTitle"/>
+            <p:ph type="title"/>
+          </p:nvPr>
+        </p:nvSpPr>
+        <p:spPr/>
+        <p:txBody>
+          <a:bodyPr/>
+          <a:lstStyle/>
+          <a:p>
+            <a:pPr eaLnBrk="1" hangingPunct="1"/>
+            <a:r>
+              <a:rPr lang="en-US" sz="2600" dirty="0">
+                <a:solidFill>
+                  <a:schemeClr val="accent2"/>
+                </a:solidFill>
+              </a:rPr>
+              <a:t>More on How C3PR Benefits Your Research</a:t>
+            </a:r>
+            <a:endParaRPr lang="en-US" sz="2600" dirty="0"/>
+          </a:p>
+        </p:txBody>
+      </p:sp>
+      <p:sp>
+        <p:nvSpPr>
+          <p:cNvPr id="30723" name="Rectangle 3"/>
+          <p:cNvSpPr>
+            <a:spLocks noGrp="1" noChangeArrowheads="1"/>
+          </p:cNvSpPr>
+          <p:nvPr>
+            <p:ph idx="1"/>
           </p:nvPr>
         </p:nvSpPr>
         <p:spPr>
           <a:xfrm>
-            <a:off x="2963564" y="3887388"/>
-            <a:ext cx="4114800" cy="609600"/>
+            <a:off x="228600" y="1143000"/>
+            <a:ext cx="8610600" cy="5486400"/>
           </a:xfrm>
         </p:spPr>
         <p:txBody>
@@ -8249,9 +8508,117 @@
           <a:p>
             <a:pPr eaLnBrk="1" hangingPunct="1"/>
             <a:r>
-              <a:rPr lang="en-US" sz="3600" dirty="0"/>
-              <a:t>Demonstration of C3PR</a:t>
-            </a:r>
+              <a:rPr lang="en-US" sz="2400" dirty="0">
+                <a:solidFill>
+                  <a:srgbClr val="008000"/>
+                </a:solidFill>
+              </a:rPr>
+              <a:t>Integrate</a:t>
+            </a:r>
+            <a:r>
+              <a:rPr lang="en-US" sz="2400" dirty="0"/>
+              <a:t> with other clinical </a:t>
+            </a:r>
+            <a:r>
+              <a:rPr lang="en-US" sz="2400" dirty="0" smtClean="0"/>
+              <a:t>systems</a:t>
+            </a:r>
+          </a:p>
+          <a:p>
+            <a:pPr lvl="1" eaLnBrk="1" hangingPunct="1"/>
+            <a:r>
+              <a:rPr lang="en-US" sz="2400" b="1" dirty="0" err="1"/>
+              <a:t>caBIG</a:t>
+            </a:r>
+            <a:r>
+              <a:rPr lang="en-US" sz="2400" b="1" dirty="0"/>
+              <a:t> Clinical Trials </a:t>
+            </a:r>
+            <a:r>
+              <a:rPr lang="en-US" sz="2400" b="1" dirty="0" smtClean="0"/>
+              <a:t>Suite (CCTS)</a:t>
+            </a:r>
+          </a:p>
+          <a:p>
+            <a:pPr lvl="2" eaLnBrk="1" hangingPunct="1"/>
+            <a:r>
+              <a:rPr lang="en-US" sz="2200" dirty="0"/>
+              <a:t>Patient Study Calendar (PSC)</a:t>
+            </a:r>
+          </a:p>
+          <a:p>
+            <a:pPr lvl="2" eaLnBrk="1" hangingPunct="1"/>
+            <a:r>
+              <a:rPr lang="en-US" sz="2200" dirty="0"/>
+              <a:t>Cancer Adverse Events Reporting System (</a:t>
+            </a:r>
+            <a:r>
+              <a:rPr lang="en-US" sz="2200" dirty="0" err="1"/>
+              <a:t>caAERS</a:t>
+            </a:r>
+            <a:r>
+              <a:rPr lang="en-US" sz="2200" dirty="0"/>
+              <a:t>)</a:t>
+            </a:r>
+          </a:p>
+          <a:p>
+            <a:pPr lvl="2" eaLnBrk="1" hangingPunct="1"/>
+            <a:r>
+              <a:rPr lang="en-US" sz="2200" dirty="0"/>
+              <a:t>Cancer Central Clinical Database (C3D)</a:t>
+            </a:r>
+          </a:p>
+          <a:p>
+            <a:pPr lvl="2" eaLnBrk="1" hangingPunct="1"/>
+            <a:r>
+              <a:rPr lang="en-US" sz="2200" dirty="0" err="1"/>
+              <a:t>LabViewer</a:t>
+            </a:r>
+            <a:r>
+              <a:rPr lang="en-US" sz="2200" dirty="0"/>
+              <a:t> / Clinical Trial Object Data System (CTODS)</a:t>
+            </a:r>
+            <a:endParaRPr lang="en-US" sz="2400" b="1" dirty="0"/>
+          </a:p>
+          <a:p>
+            <a:pPr lvl="1" eaLnBrk="1" hangingPunct="1"/>
+            <a:r>
+              <a:rPr lang="en-US" sz="2400" b="1" dirty="0"/>
+              <a:t>Multi-site Trials</a:t>
+            </a:r>
+          </a:p>
+          <a:p>
+            <a:pPr lvl="2" eaLnBrk="1" hangingPunct="1"/>
+            <a:r>
+              <a:rPr lang="en-US" sz="2200" dirty="0"/>
+              <a:t>Coordinating site shares study definition with affiliate sites</a:t>
+            </a:r>
+          </a:p>
+          <a:p>
+            <a:pPr lvl="2" eaLnBrk="1" hangingPunct="1"/>
+            <a:r>
+              <a:rPr lang="en-US" sz="2200" dirty="0"/>
+              <a:t>Affiliate sites exchange registration information</a:t>
+            </a:r>
+          </a:p>
+          <a:p>
+            <a:pPr lvl="1" eaLnBrk="1" hangingPunct="1"/>
+            <a:r>
+              <a:rPr lang="en-US" sz="2400" b="1" dirty="0"/>
+              <a:t>NCI Enterprise Services</a:t>
+            </a:r>
+          </a:p>
+          <a:p>
+            <a:pPr lvl="2" eaLnBrk="1" hangingPunct="1"/>
+            <a:r>
+              <a:rPr lang="en-US" sz="2200" dirty="0"/>
+              <a:t>Access to Clinical Trials Reporting Program (CTRP) data, such as protocols, </a:t>
+            </a:r>
+            <a:r>
+              <a:rPr lang="en-US" sz="2200" dirty="0" smtClean="0"/>
+              <a:t>persons, organizations and their corresponding associations</a:t>
+            </a:r>
+            <a:endParaRPr lang="en-US" sz="2200" dirty="0"/>
           </a:p>
         </p:txBody>
       </p:sp>
@@ -8289,18 +8656,18 @@
       </p:grpSpPr>
       <p:sp>
         <p:nvSpPr>
-          <p:cNvPr id="34818" name="Rectangle 2"/>
+          <p:cNvPr id="32770" name="Rectangle 2"/>
           <p:cNvSpPr>
             <a:spLocks noGrp="1" noChangeArrowheads="1"/>
           </p:cNvSpPr>
           <p:nvPr>
-            <p:ph type="title" idx="4294967295"/>
+            <p:ph type="ctrTitle"/>
           </p:nvPr>
         </p:nvSpPr>
         <p:spPr>
           <a:xfrm>
-            <a:off x="777540" y="-207328"/>
-            <a:ext cx="6858000" cy="1143000"/>
+            <a:off x="2963564" y="3887388"/>
+            <a:ext cx="4114800" cy="609600"/>
           </a:xfrm>
         </p:spPr>
         <p:txBody>
@@ -8309,397 +8676,12 @@
           <a:p>
             <a:pPr eaLnBrk="1" hangingPunct="1"/>
             <a:r>
-              <a:rPr lang="en-US" dirty="0"/>
-              <a:t>Key Functions for Demo</a:t>
-            </a:r>
-          </a:p>
-        </p:txBody>
-      </p:sp>
-      <p:sp>
-        <p:nvSpPr>
-          <p:cNvPr id="34819" name="Rectangle 3"/>
-          <p:cNvSpPr>
-            <a:spLocks noGrp="1" noChangeArrowheads="1"/>
-          </p:cNvSpPr>
-          <p:nvPr>
-            <p:ph type="body" sz="half" idx="4294967295"/>
-          </p:nvPr>
-        </p:nvSpPr>
-        <p:spPr>
-          <a:xfrm>
-            <a:off x="0" y="1371600"/>
-            <a:ext cx="4151313" cy="4953000"/>
-          </a:xfrm>
-        </p:spPr>
-        <p:txBody>
-          <a:bodyPr/>
-          <a:lstStyle/>
-          <a:p>
-            <a:pPr marL="228600" indent="-228600" eaLnBrk="1" hangingPunct="1">
-              <a:buFontTx/>
-              <a:buNone/>
-            </a:pPr>
-            <a:endParaRPr lang="en-US" sz="1800" b="0"/>
-          </a:p>
-          <a:p>
-            <a:pPr marL="228600" indent="-228600" eaLnBrk="1" hangingPunct="1">
-              <a:buFontTx/>
-              <a:buNone/>
-            </a:pPr>
-            <a:endParaRPr lang="en-US" sz="1600"/>
-          </a:p>
-        </p:txBody>
-      </p:sp>
-      <p:sp>
-        <p:nvSpPr>
-          <p:cNvPr id="34820" name="Rectangle 4"/>
-          <p:cNvSpPr>
-            <a:spLocks noGrp="1" noChangeArrowheads="1"/>
-          </p:cNvSpPr>
-          <p:nvPr>
-            <p:ph type="body" sz="half" idx="4294967295"/>
-          </p:nvPr>
-        </p:nvSpPr>
-        <p:spPr>
-          <a:xfrm>
-            <a:off x="5181600" y="1447800"/>
-            <a:ext cx="3962400" cy="4419600"/>
-          </a:xfrm>
-        </p:spPr>
-        <p:txBody>
-          <a:bodyPr/>
-          <a:lstStyle/>
-          <a:p>
-            <a:pPr marL="0" indent="0" eaLnBrk="1" hangingPunct="1">
-              <a:buFontTx/>
-              <a:buNone/>
-            </a:pPr>
-            <a:r>
-              <a:rPr lang="en-US" sz="2400"/>
-              <a:t>     Adopters of C3PR</a:t>
-            </a:r>
-          </a:p>
-          <a:p>
-            <a:pPr marL="0" indent="0" eaLnBrk="1" hangingPunct="1">
-              <a:buFontTx/>
-              <a:buNone/>
-            </a:pPr>
-            <a:endParaRPr lang="en-US" sz="2400"/>
-          </a:p>
-          <a:p>
-            <a:pPr marL="0" indent="0" eaLnBrk="1" hangingPunct="1">
-              <a:buFontTx/>
-              <a:buNone/>
-            </a:pPr>
-            <a:endParaRPr lang="en-US" sz="2400"/>
-          </a:p>
-          <a:p>
-            <a:pPr marL="0" indent="0" eaLnBrk="1" hangingPunct="1">
-              <a:buFontTx/>
-              <a:buNone/>
-            </a:pPr>
-            <a:endParaRPr lang="en-US" sz="2800" b="0"/>
-          </a:p>
-          <a:p>
-            <a:pPr marL="0" indent="0" eaLnBrk="1" hangingPunct="1">
-              <a:buFontTx/>
-              <a:buNone/>
-            </a:pPr>
-            <a:endParaRPr lang="en-US" sz="2800" b="0"/>
-          </a:p>
-          <a:p>
-            <a:pPr marL="0" indent="0" eaLnBrk="1" hangingPunct="1">
-              <a:buFontTx/>
-              <a:buNone/>
-            </a:pPr>
-            <a:endParaRPr lang="en-US" sz="2800" b="0"/>
-          </a:p>
-          <a:p>
-            <a:pPr lvl="1" eaLnBrk="1" hangingPunct="1">
-              <a:buFontTx/>
-              <a:buNone/>
-            </a:pPr>
-            <a:endParaRPr lang="en-US" sz="2400" b="1"/>
-          </a:p>
-          <a:p>
-            <a:pPr lvl="1" eaLnBrk="1" hangingPunct="1">
-              <a:buFontTx/>
-              <a:buNone/>
-            </a:pPr>
-            <a:endParaRPr lang="en-US" sz="2400" b="1"/>
-          </a:p>
-          <a:p>
-            <a:pPr lvl="1" eaLnBrk="1" hangingPunct="1">
-              <a:buFontTx/>
-              <a:buNone/>
-            </a:pPr>
-            <a:endParaRPr lang="en-US" sz="2400" b="1"/>
-          </a:p>
-        </p:txBody>
-      </p:sp>
-      <p:sp>
-        <p:nvSpPr>
-          <p:cNvPr id="34821" name="Rectangle 5"/>
-          <p:cNvSpPr>
-            <a:spLocks noChangeArrowheads="1"/>
-          </p:cNvSpPr>
-          <p:nvPr/>
-        </p:nvSpPr>
-        <p:spPr bwMode="auto">
-          <a:xfrm>
-            <a:off x="304800" y="1295400"/>
-            <a:ext cx="4648200" cy="5334000"/>
-          </a:xfrm>
-          <a:prstGeom prst="rect">
-            <a:avLst/>
-          </a:prstGeom>
-          <a:noFill/>
-          <a:ln w="9525">
-            <a:noFill/>
-            <a:miter lim="800000"/>
-            <a:headEnd/>
-            <a:tailEnd/>
-          </a:ln>
-        </p:spPr>
-        <p:txBody>
-          <a:bodyPr>
-            <a:prstTxWarp prst="textNoShape">
-              <a:avLst/>
-            </a:prstTxWarp>
-          </a:bodyPr>
-          <a:lstStyle/>
-          <a:p>
-            <a:pPr marL="336550" indent="-336550">
-              <a:spcBef>
-                <a:spcPct val="20000"/>
-              </a:spcBef>
-              <a:buClr>
-                <a:srgbClr val="00AAF6"/>
-              </a:buClr>
-              <a:buFontTx/>
-              <a:buChar char="•"/>
-            </a:pPr>
-            <a:endParaRPr lang="en-US" sz="1800" b="1"/>
-          </a:p>
-          <a:p>
-            <a:pPr marL="336550" indent="-336550">
-              <a:spcBef>
-                <a:spcPct val="20000"/>
-              </a:spcBef>
-              <a:buClr>
-                <a:srgbClr val="00AAF6"/>
-              </a:buClr>
-            </a:pPr>
-            <a:endParaRPr lang="en-US" b="1"/>
-          </a:p>
-          <a:p>
-            <a:pPr marL="336550" indent="-336550">
-              <a:spcBef>
-                <a:spcPct val="20000"/>
-              </a:spcBef>
-              <a:buClr>
-                <a:srgbClr val="00AAF6"/>
-              </a:buClr>
-              <a:buFontTx/>
-              <a:buChar char="•"/>
-            </a:pPr>
-            <a:r>
-              <a:rPr lang="en-US" sz="2400" b="1"/>
-              <a:t>Create a Study</a:t>
-            </a:r>
-          </a:p>
-          <a:p>
-            <a:pPr marL="336550" indent="-336550">
-              <a:spcBef>
-                <a:spcPct val="20000"/>
-              </a:spcBef>
-              <a:buClr>
-                <a:srgbClr val="00AAF6"/>
-              </a:buClr>
-              <a:buFontTx/>
-              <a:buChar char="•"/>
-            </a:pPr>
-            <a:r>
-              <a:rPr lang="en-US" sz="2400" b="1"/>
-              <a:t>Create a Subject</a:t>
-            </a:r>
-          </a:p>
-          <a:p>
-            <a:pPr marL="336550" indent="-336550">
-              <a:spcBef>
-                <a:spcPct val="20000"/>
-              </a:spcBef>
-              <a:buClr>
-                <a:srgbClr val="00AAF6"/>
-              </a:buClr>
-              <a:buFontTx/>
-              <a:buChar char="•"/>
-            </a:pPr>
-            <a:r>
-              <a:rPr lang="en-US" sz="2400" b="1"/>
-              <a:t>Register the Subject</a:t>
-            </a:r>
-          </a:p>
-          <a:p>
-            <a:pPr marL="336550" indent="-336550">
-              <a:spcBef>
-                <a:spcPct val="20000"/>
-              </a:spcBef>
-              <a:buClr>
-                <a:srgbClr val="00AAF6"/>
-              </a:buClr>
-              <a:buFontTx/>
-              <a:buChar char="•"/>
-            </a:pPr>
-            <a:r>
-              <a:rPr lang="en-US" sz="2400" b="1"/>
-              <a:t>Manage the Registration</a:t>
-            </a:r>
-          </a:p>
-          <a:p>
-            <a:pPr marL="336550" indent="-336550">
-              <a:spcBef>
-                <a:spcPct val="20000"/>
-              </a:spcBef>
-              <a:buClr>
-                <a:srgbClr val="00AAF6"/>
-              </a:buClr>
-              <a:buFontTx/>
-              <a:buChar char="•"/>
-            </a:pPr>
-            <a:r>
-              <a:rPr lang="en-US" sz="2400" b="1"/>
-              <a:t>Review other functions</a:t>
-            </a:r>
-          </a:p>
-          <a:p>
-            <a:pPr marL="336550" indent="-336550">
-              <a:spcBef>
-                <a:spcPct val="20000"/>
-              </a:spcBef>
-              <a:buClr>
-                <a:srgbClr val="00AAF6"/>
-              </a:buClr>
-              <a:buFontTx/>
-              <a:buChar char="•"/>
-            </a:pPr>
-            <a:endParaRPr lang="en-US" b="1"/>
-          </a:p>
-          <a:p>
-            <a:pPr marL="336550" indent="-336550">
-              <a:spcBef>
-                <a:spcPct val="20000"/>
-              </a:spcBef>
-              <a:buClr>
-                <a:srgbClr val="00AAF6"/>
-              </a:buClr>
-              <a:buFontTx/>
-              <a:buChar char="•"/>
-            </a:pPr>
-            <a:endParaRPr lang="en-US" sz="1800" b="1"/>
-          </a:p>
-        </p:txBody>
-      </p:sp>
-      <p:pic>
-        <p:nvPicPr>
-          <p:cNvPr id="34822" name="Picture 7" descr="Duke University Health System Shield">
-            <a:hlinkClick r:id="rId3"/>
-          </p:cNvPr>
-          <p:cNvPicPr>
-            <a:picLocks noChangeAspect="1" noChangeArrowheads="1"/>
-          </p:cNvPicPr>
-          <p:nvPr/>
-        </p:nvPicPr>
-        <p:blipFill>
-          <a:blip r:embed="rId4"/>
-          <a:srcRect/>
-          <a:stretch>
-            <a:fillRect/>
-          </a:stretch>
-        </p:blipFill>
-        <p:spPr bwMode="auto">
-          <a:xfrm>
-            <a:off x="4800600" y="2590800"/>
-            <a:ext cx="330200" cy="762000"/>
-          </a:xfrm>
-          <a:prstGeom prst="rect">
-            <a:avLst/>
-          </a:prstGeom>
-          <a:noFill/>
-          <a:ln w="9525">
-            <a:noFill/>
-            <a:miter lim="800000"/>
-            <a:headEnd/>
-            <a:tailEnd/>
-          </a:ln>
-        </p:spPr>
-      </p:pic>
-      <p:pic>
-        <p:nvPicPr>
-          <p:cNvPr id="34823" name="Picture 9" descr="Duke Comprehensive Cancer Center">
-            <a:hlinkClick r:id="rId3"/>
-          </p:cNvPr>
-          <p:cNvPicPr>
-            <a:picLocks noChangeAspect="1" noChangeArrowheads="1"/>
-          </p:cNvPicPr>
-          <p:nvPr/>
-        </p:nvPicPr>
-        <p:blipFill>
-          <a:blip r:embed="rId5"/>
-          <a:srcRect/>
-          <a:stretch>
-            <a:fillRect/>
-          </a:stretch>
-        </p:blipFill>
-        <p:spPr bwMode="auto">
-          <a:xfrm>
-            <a:off x="5153025" y="2590800"/>
-            <a:ext cx="3305175" cy="762000"/>
-          </a:xfrm>
-          <a:prstGeom prst="rect">
-            <a:avLst/>
-          </a:prstGeom>
-          <a:noFill/>
-          <a:ln w="9525">
-            <a:noFill/>
-            <a:miter lim="800000"/>
-            <a:headEnd/>
-            <a:tailEnd/>
-          </a:ln>
-        </p:spPr>
-      </p:pic>
-      <p:pic>
-        <p:nvPicPr>
-          <p:cNvPr id="34824" name="Picture 11" descr="Wake Forest University Baptist Medical Center"/>
-          <p:cNvPicPr>
-            <a:picLocks noChangeAspect="1" noChangeArrowheads="1"/>
-          </p:cNvPicPr>
-          <p:nvPr/>
-        </p:nvPicPr>
-        <p:blipFill>
-          <a:blip r:embed="rId6"/>
-          <a:srcRect/>
-          <a:stretch>
-            <a:fillRect/>
-          </a:stretch>
-        </p:blipFill>
-        <p:spPr bwMode="auto">
-          <a:xfrm>
-            <a:off x="4724400" y="3937000"/>
-            <a:ext cx="4000500" cy="1066800"/>
-          </a:xfrm>
-          <a:prstGeom prst="rect">
-            <a:avLst/>
-          </a:prstGeom>
-          <a:noFill/>
-          <a:ln w="9525">
-            <a:noFill/>
-            <a:miter lim="800000"/>
-            <a:headEnd/>
-            <a:tailEnd/>
-          </a:ln>
-        </p:spPr>
-      </p:pic>
+              <a:rPr lang="en-US" sz="3600" dirty="0"/>
+              <a:t>Demonstration of C3PR</a:t>
+            </a:r>
+          </a:p>
+        </p:txBody>
+      </p:sp>
     </p:spTree>
   </p:cSld>
   <p:clrMapOvr>

</xml_diff>